<commit_message>
Minor e2 preview update
</commit_message>
<xml_diff>
--- a/eece2160/f17/lectures/eece.2160f17_lec24_exam2_preview.pptx
+++ b/eece2160/f17/lectures/eece.2160f17_lec24_exam2_preview.pptx
@@ -1337,7 +1337,7 @@
             </a:pPr>
             <a:fld id="{312C4621-8380-074F-A8D3-CE6AE0F175C3}" type="datetime1">
               <a:rPr lang="en-US" smtClean="0"/>
-              <a:t>11/6/17</a:t>
+              <a:t>11/7/17</a:t>
             </a:fld>
             <a:endParaRPr lang="en-US"/>
           </a:p>
@@ -1542,7 +1542,7 @@
             </a:pPr>
             <a:fld id="{7FB11424-F090-0247-AF23-752B1E23021F}" type="datetime1">
               <a:rPr lang="en-US" smtClean="0"/>
-              <a:t>11/6/17</a:t>
+              <a:t>11/7/17</a:t>
             </a:fld>
             <a:endParaRPr lang="en-US"/>
           </a:p>
@@ -1756,7 +1756,7 @@
             </a:pPr>
             <a:fld id="{FF18B39D-BE05-6C4D-8CFC-2DEBD5FB6B50}" type="datetime1">
               <a:rPr lang="en-US" smtClean="0"/>
-              <a:t>11/6/17</a:t>
+              <a:t>11/7/17</a:t>
             </a:fld>
             <a:endParaRPr lang="en-US"/>
           </a:p>
@@ -2027,7 +2027,7 @@
             </a:pPr>
             <a:fld id="{037C5B95-2568-9040-ACEA-6081CFDD3259}" type="datetime1">
               <a:rPr lang="en-US" smtClean="0"/>
-              <a:t>11/6/17</a:t>
+              <a:t>11/7/17</a:t>
             </a:fld>
             <a:endParaRPr lang="en-US"/>
           </a:p>
@@ -2298,7 +2298,7 @@
             </a:pPr>
             <a:fld id="{9E88AD11-FD74-3144-BDD5-172238E29BA9}" type="datetime1">
               <a:rPr lang="en-US" smtClean="0"/>
-              <a:t>11/6/17</a:t>
+              <a:t>11/7/17</a:t>
             </a:fld>
             <a:endParaRPr lang="en-US"/>
           </a:p>
@@ -2502,7 +2502,7 @@
             </a:pPr>
             <a:fld id="{76CB1508-0102-DF4A-BDE1-893F952F1681}" type="datetime1">
               <a:rPr lang="en-US" smtClean="0"/>
-              <a:t>11/6/17</a:t>
+              <a:t>11/7/17</a:t>
             </a:fld>
             <a:endParaRPr lang="en-US"/>
           </a:p>
@@ -2728,7 +2728,7 @@
             </a:pPr>
             <a:fld id="{D19A5A4A-7876-7B44-B901-E1EFC28920A4}" type="datetime1">
               <a:rPr lang="en-US" smtClean="0"/>
-              <a:t>11/6/17</a:t>
+              <a:t>11/7/17</a:t>
             </a:fld>
             <a:endParaRPr lang="en-US"/>
           </a:p>
@@ -3050,7 +3050,7 @@
             </a:pPr>
             <a:fld id="{24977673-6F86-3042-9F62-ECCA206EF580}" type="datetime1">
               <a:rPr lang="en-US" smtClean="0"/>
-              <a:t>11/6/17</a:t>
+              <a:t>11/7/17</a:t>
             </a:fld>
             <a:endParaRPr lang="en-US"/>
           </a:p>
@@ -3511,7 +3511,7 @@
             </a:pPr>
             <a:fld id="{34F48C00-A643-E44A-8917-5FD07C19D58F}" type="datetime1">
               <a:rPr lang="en-US" smtClean="0"/>
-              <a:t>11/6/17</a:t>
+              <a:t>11/7/17</a:t>
             </a:fld>
             <a:endParaRPr lang="en-US"/>
           </a:p>
@@ -3663,7 +3663,7 @@
             </a:pPr>
             <a:fld id="{D0921E99-3E0B-8841-AB77-442DE4BDCC32}" type="datetime1">
               <a:rPr lang="en-US" smtClean="0"/>
-              <a:t>11/6/17</a:t>
+              <a:t>11/7/17</a:t>
             </a:fld>
             <a:endParaRPr lang="en-US"/>
           </a:p>
@@ -3792,7 +3792,7 @@
             </a:pPr>
             <a:fld id="{B0869521-B1EF-114F-A91C-F1EC16D2E10A}" type="datetime1">
               <a:rPr lang="en-US" smtClean="0"/>
-              <a:t>11/6/17</a:t>
+              <a:t>11/7/17</a:t>
             </a:fld>
             <a:endParaRPr lang="en-US"/>
           </a:p>
@@ -4103,7 +4103,7 @@
             </a:pPr>
             <a:fld id="{0A30D28F-3862-BE44-8ADC-44350CD4FC91}" type="datetime1">
               <a:rPr lang="en-US" smtClean="0"/>
-              <a:t>11/6/17</a:t>
+              <a:t>11/7/17</a:t>
             </a:fld>
             <a:endParaRPr lang="en-US"/>
           </a:p>
@@ -4391,7 +4391,7 @@
             </a:pPr>
             <a:fld id="{27C42D9D-4737-4D47-93B8-CEC99DDDC571}" type="datetime1">
               <a:rPr lang="en-US" smtClean="0"/>
-              <a:t>11/6/17</a:t>
+              <a:t>11/7/17</a:t>
             </a:fld>
             <a:endParaRPr lang="en-US"/>
           </a:p>
@@ -4699,7 +4699,7 @@
             </a:pPr>
             <a:fld id="{52435221-6DF8-234F-9791-5A4E5C4F5CF9}" type="datetime1">
               <a:rPr lang="en-US" smtClean="0"/>
-              <a:t>11/6/17</a:t>
+              <a:t>11/7/17</a:t>
             </a:fld>
             <a:endParaRPr lang="en-US"/>
           </a:p>
@@ -5897,16 +5897,10 @@
               <a:t>strncpy</a:t>
             </a:r>
             <a:r>
-              <a:rPr lang="en-US" smtClean="0">
-                <a:cs typeface="Courier New" pitchFamily="49" charset="0"/>
-              </a:rPr>
-              <a:t>() not </a:t>
-            </a:r>
-            <a:r>
               <a:rPr lang="en-US" dirty="0" smtClean="0">
                 <a:cs typeface="Courier New" pitchFamily="49" charset="0"/>
               </a:rPr>
-              <a:t>guaranteed to add null terminator</a:t>
+              <a:t>() not guaranteed to add null terminator</a:t>
             </a:r>
           </a:p>
           <a:p>
@@ -6027,7 +6021,49 @@
               <a:rPr lang="en-US" dirty="0" smtClean="0">
                 <a:cs typeface="Courier New" pitchFamily="49" charset="0"/>
               </a:rPr>
-              <a:t>Returns 0 if s1 == s2, 1 if s1 &gt; s2, -1 if s1 &lt; s2</a:t>
+              <a:t>Returns 0 if s1 == s2</a:t>
+            </a:r>
+            <a:r>
+              <a:rPr lang="en-US" smtClean="0">
+                <a:cs typeface="Courier New" pitchFamily="49" charset="0"/>
+              </a:rPr>
+              <a:t>, </a:t>
+            </a:r>
+            <a:r>
+              <a:rPr lang="en-US" smtClean="0">
+                <a:cs typeface="Courier New" pitchFamily="49" charset="0"/>
+              </a:rPr>
+              <a:t>&gt;0 </a:t>
+            </a:r>
+            <a:r>
+              <a:rPr lang="en-US" dirty="0" smtClean="0">
+                <a:cs typeface="Courier New" pitchFamily="49" charset="0"/>
+              </a:rPr>
+              <a:t>if s1 &gt; s2</a:t>
+            </a:r>
+            <a:r>
+              <a:rPr lang="en-US" smtClean="0">
+                <a:cs typeface="Courier New" pitchFamily="49" charset="0"/>
+              </a:rPr>
+              <a:t>, </a:t>
+            </a:r>
+            <a:r>
+              <a:rPr lang="en-US" smtClean="0">
+                <a:cs typeface="Courier New" pitchFamily="49" charset="0"/>
+              </a:rPr>
+              <a:t>&lt;0</a:t>
+            </a:r>
+            <a:r>
+              <a:rPr lang="en-US" smtClean="0">
+                <a:cs typeface="Courier New" pitchFamily="49" charset="0"/>
+              </a:rPr>
+              <a:t> </a:t>
+            </a:r>
+            <a:r>
+              <a:rPr lang="en-US" dirty="0" smtClean="0">
+                <a:cs typeface="Courier New" pitchFamily="49" charset="0"/>
+              </a:rPr>
+              <a:t>if s1 &lt; s2</a:t>
             </a:r>
             <a:endParaRPr lang="en-US" dirty="0">
               <a:cs typeface="Courier New" pitchFamily="49" charset="0"/>
@@ -6184,7 +6220,7 @@
               <a:rPr lang="en-US" sz="1200" smtClean="0">
                 <a:latin typeface="Garamond" charset="0"/>
               </a:rPr>
-              <a:t>11/6/17</a:t>
+              <a:t>11/7/17</a:t>
             </a:fld>
             <a:endParaRPr lang="en-US" sz="1200">
               <a:latin typeface="Garamond" charset="0"/>
@@ -6827,7 +6863,7 @@
               <a:rPr lang="en-US" sz="1200" smtClean="0">
                 <a:latin typeface="Garamond" charset="0"/>
               </a:rPr>
-              <a:t>11/6/17</a:t>
+              <a:t>11/7/17</a:t>
             </a:fld>
             <a:endParaRPr lang="en-US" sz="1200">
               <a:latin typeface="Garamond" charset="0"/>
@@ -7333,7 +7369,7 @@
               <a:rPr lang="en-US" sz="1200" smtClean="0">
                 <a:latin typeface="Garamond" charset="0"/>
               </a:rPr>
-              <a:t>11/6/17</a:t>
+              <a:t>11/7/17</a:t>
             </a:fld>
             <a:endParaRPr lang="en-US" sz="1200">
               <a:latin typeface="Garamond" charset="0"/>
@@ -7822,7 +7858,7 @@
               <a:rPr lang="en-US" sz="1200" smtClean="0">
                 <a:latin typeface="Garamond" charset="0"/>
               </a:rPr>
-              <a:t>11/6/17</a:t>
+              <a:t>11/7/17</a:t>
             </a:fld>
             <a:endParaRPr lang="en-US" sz="1200">
               <a:latin typeface="Garamond" charset="0"/>
@@ -8465,7 +8501,7 @@
               <a:rPr lang="en-US" sz="1200" smtClean="0">
                 <a:latin typeface="Garamond" charset="0"/>
               </a:rPr>
-              <a:t>11/6/17</a:t>
+              <a:t>11/7/17</a:t>
             </a:fld>
             <a:endParaRPr lang="en-US" sz="1200">
               <a:latin typeface="Garamond" charset="0"/>
@@ -9129,7 +9165,7 @@
               <a:rPr lang="en-US" sz="1200" smtClean="0">
                 <a:latin typeface="Garamond" charset="0"/>
               </a:rPr>
-              <a:t>11/6/17</a:t>
+              <a:t>11/7/17</a:t>
             </a:fld>
             <a:endParaRPr lang="en-US" sz="1200">
               <a:latin typeface="Garamond" charset="0"/>
@@ -9809,7 +9845,7 @@
               <a:rPr lang="en-US" sz="1200" smtClean="0">
                 <a:latin typeface="Garamond" charset="0"/>
               </a:rPr>
-              <a:t>11/6/17</a:t>
+              <a:t>11/7/17</a:t>
             </a:fld>
             <a:endParaRPr lang="en-US" sz="1200">
               <a:latin typeface="Garamond" charset="0"/>
@@ -10375,7 +10411,7 @@
               <a:rPr lang="en-US" sz="1200" smtClean="0">
                 <a:latin typeface="Garamond" charset="0"/>
               </a:rPr>
-              <a:t>11/6/17</a:t>
+              <a:t>11/7/17</a:t>
             </a:fld>
             <a:endParaRPr lang="en-US" sz="1200">
               <a:latin typeface="Garamond" charset="0"/>
@@ -10922,7 +10958,7 @@
               <a:rPr lang="en-US" sz="1200" smtClean="0">
                 <a:latin typeface="Garamond" charset="0"/>
               </a:rPr>
-              <a:t>11/6/17</a:t>
+              <a:t>11/7/17</a:t>
             </a:fld>
             <a:endParaRPr lang="en-US" sz="1200">
               <a:latin typeface="Garamond" charset="0"/>
@@ -11563,7 +11599,7 @@
               <a:rPr lang="en-US" sz="1200" smtClean="0">
                 <a:latin typeface="Garamond" charset="0"/>
               </a:rPr>
-              <a:t>11/6/17</a:t>
+              <a:t>11/7/17</a:t>
             </a:fld>
             <a:endParaRPr lang="en-US" sz="1200">
               <a:latin typeface="Garamond" charset="0"/>
@@ -13616,7 +13652,7 @@
               <a:rPr lang="en-US" sz="1200" smtClean="0">
                 <a:latin typeface="Garamond" charset="0"/>
               </a:rPr>
-              <a:t>11/6/17</a:t>
+              <a:t>11/7/17</a:t>
             </a:fld>
             <a:endParaRPr lang="en-US" sz="1200">
               <a:latin typeface="Garamond" charset="0"/>

</xml_diff>